<commit_message>
added badges; fixed big image overview
</commit_message>
<xml_diff>
--- a/media/Big.pptx
+++ b/media/Big.pptx
@@ -10509,13 +10509,6 @@
               </a:rPr>
               <a:t>Alignment</a:t>
             </a:r>
-            <a:endParaRPr lang="en-US" sz="8000" b="1" dirty="0" smtClean="0">
-              <a:solidFill>
-                <a:srgbClr val="000000"/>
-              </a:solidFill>
-              <a:latin typeface="Courier New"/>
-              <a:cs typeface="Courier New"/>
-            </a:endParaRPr>
           </a:p>
         </p:txBody>
       </p:sp>
@@ -11279,7 +11272,17 @@
                 <a:latin typeface="Courier New"/>
                 <a:cs typeface="Courier New"/>
               </a:rPr>
-              <a:t>                         </a:t>
+              <a:t>                           </a:t>
+            </a:r>
+            <a:r>
+              <a:rPr lang="en-US" sz="2400" b="1" dirty="0" smtClean="0">
+                <a:solidFill>
+                  <a:schemeClr val="tx2"/>
+                </a:solidFill>
+                <a:latin typeface="Courier New"/>
+                <a:cs typeface="Courier New"/>
+              </a:rPr>
+              <a:t>Sample 1</a:t>
             </a:r>
             <a:r>
               <a:rPr lang="en-US" sz="2400" dirty="0" smtClean="0">
@@ -11289,47 +11292,17 @@
                 <a:latin typeface="Courier New"/>
                 <a:cs typeface="Courier New"/>
               </a:rPr>
-              <a:t>  </a:t>
+              <a:t> </a:t>
             </a:r>
             <a:r>
               <a:rPr lang="en-US" sz="2400" b="1" dirty="0" smtClean="0">
                 <a:solidFill>
-                  <a:schemeClr val="tx2"/>
-                </a:solidFill>
-                <a:latin typeface="Courier New"/>
-                <a:cs typeface="Courier New"/>
-              </a:rPr>
-              <a:t>Sample 1</a:t>
-            </a:r>
-            <a:r>
-              <a:rPr lang="en-US" sz="2400" dirty="0" smtClean="0">
-                <a:solidFill>
-                  <a:schemeClr val="tx2"/>
-                </a:solidFill>
-                <a:latin typeface="Courier New"/>
-                <a:cs typeface="Courier New"/>
-              </a:rPr>
-              <a:t> </a:t>
-            </a:r>
-            <a:r>
-              <a:rPr lang="en-US" sz="2400" b="1" dirty="0" smtClean="0">
-                <a:solidFill>
                   <a:srgbClr val="000000"/>
                 </a:solidFill>
                 <a:latin typeface="Courier New"/>
                 <a:cs typeface="Courier New"/>
               </a:rPr>
-              <a:t>loops </a:t>
-            </a:r>
-            <a:r>
-              <a:rPr lang="en-US" sz="2400" b="1" dirty="0" smtClean="0">
-                <a:solidFill>
-                  <a:srgbClr val="000000"/>
-                </a:solidFill>
-                <a:latin typeface="Courier New"/>
-                <a:cs typeface="Courier New"/>
-              </a:rPr>
-              <a:t>Object</a:t>
+              <a:t>loops Object</a:t>
             </a:r>
             <a:endParaRPr lang="en-US" sz="2400" dirty="0" smtClean="0">
               <a:solidFill>
@@ -11460,8 +11433,10 @@
                 <a:latin typeface="Courier New"/>
                 <a:cs typeface="Courier New"/>
               </a:rPr>
-              <a:t>[1] </a:t>
-            </a:r>
+              <a:t>[1] Z  1200  2300</a:t>
+            </a:r>
+          </a:p>
+          <a:p>
             <a:r>
               <a:rPr lang="en-US" sz="1600" dirty="0" smtClean="0">
                 <a:solidFill>
@@ -11470,15 +11445,8 @@
                 <a:latin typeface="Courier New"/>
                 <a:cs typeface="Courier New"/>
               </a:rPr>
-              <a:t>Z  1200  2300</a:t>
-            </a:r>
-            <a:endParaRPr lang="en-US" sz="1600" dirty="0" smtClean="0">
-              <a:solidFill>
-                <a:schemeClr val="tx2"/>
-              </a:solidFill>
-              <a:latin typeface="Courier New"/>
-              <a:cs typeface="Courier New"/>
-            </a:endParaRPr>
+              <a:t>[2] Z  4000  5200</a:t>
+            </a:r>
           </a:p>
           <a:p>
             <a:r>
@@ -11489,8 +11457,10 @@
                 <a:latin typeface="Courier New"/>
                 <a:cs typeface="Courier New"/>
               </a:rPr>
-              <a:t>[2] </a:t>
-            </a:r>
+              <a:t>[3] Z  6500  7800</a:t>
+            </a:r>
+          </a:p>
+          <a:p>
             <a:r>
               <a:rPr lang="en-US" sz="1600" dirty="0" smtClean="0">
                 <a:solidFill>
@@ -11499,73 +11469,8 @@
                 <a:latin typeface="Courier New"/>
                 <a:cs typeface="Courier New"/>
               </a:rPr>
-              <a:t>Z  4000  5200</a:t>
-            </a:r>
-            <a:endParaRPr lang="en-US" sz="1600" dirty="0" smtClean="0">
-              <a:solidFill>
-                <a:schemeClr val="tx2"/>
-              </a:solidFill>
-              <a:latin typeface="Courier New"/>
-              <a:cs typeface="Courier New"/>
-            </a:endParaRPr>
-          </a:p>
-          <a:p>
-            <a:r>
-              <a:rPr lang="en-US" sz="1600" dirty="0" smtClean="0">
-                <a:solidFill>
-                  <a:schemeClr val="tx2"/>
-                </a:solidFill>
-                <a:latin typeface="Courier New"/>
-                <a:cs typeface="Courier New"/>
-              </a:rPr>
-              <a:t>[3] </a:t>
-            </a:r>
-            <a:r>
-              <a:rPr lang="en-US" sz="1600" dirty="0" smtClean="0">
-                <a:solidFill>
-                  <a:schemeClr val="tx2"/>
-                </a:solidFill>
-                <a:latin typeface="Courier New"/>
-                <a:cs typeface="Courier New"/>
-              </a:rPr>
-              <a:t>Z  6500  7800</a:t>
-            </a:r>
-            <a:endParaRPr lang="en-US" sz="1600" dirty="0" smtClean="0">
-              <a:solidFill>
-                <a:schemeClr val="tx2"/>
-              </a:solidFill>
-              <a:latin typeface="Courier New"/>
-              <a:cs typeface="Courier New"/>
-            </a:endParaRPr>
-          </a:p>
-          <a:p>
-            <a:r>
-              <a:rPr lang="en-US" sz="1600" dirty="0" smtClean="0">
-                <a:solidFill>
-                  <a:schemeClr val="tx2"/>
-                </a:solidFill>
-                <a:latin typeface="Courier New"/>
-                <a:cs typeface="Courier New"/>
-              </a:rPr>
-              <a:t>[4] </a:t>
-            </a:r>
-            <a:r>
-              <a:rPr lang="en-US" sz="1600" dirty="0" smtClean="0">
-                <a:solidFill>
-                  <a:schemeClr val="tx2"/>
-                </a:solidFill>
-                <a:latin typeface="Courier New"/>
-                <a:cs typeface="Courier New"/>
-              </a:rPr>
-              <a:t>Z  8900  9900</a:t>
-            </a:r>
-            <a:endParaRPr lang="en-US" sz="1600" dirty="0" smtClean="0">
-              <a:solidFill>
-                <a:schemeClr val="tx2"/>
-              </a:solidFill>
-              <a:latin typeface="Courier New"/>
-              <a:cs typeface="Courier New"/>
-            </a:endParaRPr>
+              <a:t>[4] Z  8900  9900</a:t>
+            </a:r>
           </a:p>
           <a:p>
             <a:pPr algn="ctr"/>
@@ -11693,8 +11598,10 @@
                 <a:latin typeface="Courier New"/>
                 <a:cs typeface="Courier New"/>
               </a:rPr>
-              <a:t>]    1     </a:t>
-            </a:r>
+              <a:t>]    1     3</a:t>
+            </a:r>
+          </a:p>
+          <a:p>
             <a:r>
               <a:rPr lang="en-US" sz="1600" dirty="0" smtClean="0">
                 <a:solidFill>
@@ -11703,17 +11610,18 @@
                 <a:latin typeface="Courier New"/>
                 <a:cs typeface="Courier New"/>
               </a:rPr>
-              <a:t>3</a:t>
-            </a:r>
-            <a:endParaRPr lang="en-US" sz="1600" dirty="0" smtClean="0">
-              <a:solidFill>
-                <a:schemeClr val="tx2"/>
-              </a:solidFill>
-              <a:latin typeface="Courier New"/>
-              <a:cs typeface="Courier New"/>
-            </a:endParaRPr>
-          </a:p>
-          <a:p>
+              <a:t>[</a:t>
+            </a:r>
+            <a:r>
+              <a:rPr lang="en-US" sz="1600" dirty="0">
+                <a:solidFill>
+                  <a:schemeClr val="tx2"/>
+                </a:solidFill>
+                <a:latin typeface="Courier New"/>
+                <a:cs typeface="Courier New"/>
+              </a:rPr>
+              <a:t>2</a:t>
+            </a:r>
             <a:r>
               <a:rPr lang="en-US" sz="1600" dirty="0" smtClean="0">
                 <a:solidFill>
@@ -11722,37 +11630,7 @@
                 <a:latin typeface="Courier New"/>
                 <a:cs typeface="Courier New"/>
               </a:rPr>
-              <a:t>[</a:t>
-            </a:r>
-            <a:r>
-              <a:rPr lang="en-US" sz="1600" dirty="0">
-                <a:solidFill>
-                  <a:schemeClr val="tx2"/>
-                </a:solidFill>
-                <a:latin typeface="Courier New"/>
-                <a:cs typeface="Courier New"/>
-              </a:rPr>
-              <a:t>2</a:t>
-            </a:r>
-            <a:r>
-              <a:rPr lang="en-US" sz="1600" dirty="0" smtClean="0">
-                <a:solidFill>
-                  <a:schemeClr val="tx2"/>
-                </a:solidFill>
-                <a:latin typeface="Courier New"/>
-                <a:cs typeface="Courier New"/>
-              </a:rPr>
-              <a:t>]    1     </a:t>
-            </a:r>
-            <a:r>
-              <a:rPr lang="en-US" sz="1600" dirty="0" smtClean="0">
-                <a:solidFill>
-                  <a:schemeClr val="tx2"/>
-                </a:solidFill>
-                <a:latin typeface="Courier New"/>
-                <a:cs typeface="Courier New"/>
-              </a:rPr>
-              <a:t>4</a:t>
+              <a:t>]    1     4</a:t>
             </a:r>
             <a:endParaRPr lang="en-US" sz="1600" dirty="0">
               <a:solidFill>
@@ -11893,8 +11771,10 @@
                 <a:latin typeface="Courier New"/>
                 <a:cs typeface="Courier New"/>
               </a:rPr>
-              <a:t>    </a:t>
-            </a:r>
+              <a:t>          S1</a:t>
+            </a:r>
+          </a:p>
+          <a:p>
             <a:r>
               <a:rPr lang="en-US" sz="1600" dirty="0" smtClean="0">
                 <a:solidFill>
@@ -11903,66 +11783,17 @@
                 <a:latin typeface="Courier New"/>
                 <a:cs typeface="Courier New"/>
               </a:rPr>
-              <a:t>      </a:t>
-            </a:r>
-            <a:r>
-              <a:rPr lang="en-US" sz="1600" dirty="0" smtClean="0">
+              <a:t>     [1]</a:t>
+            </a:r>
+            <a:r>
+              <a:rPr lang="en-US" sz="800" dirty="0" smtClean="0">
                 <a:solidFill>
                   <a:schemeClr val="tx2"/>
                 </a:solidFill>
                 <a:latin typeface="Courier New"/>
                 <a:cs typeface="Courier New"/>
               </a:rPr>
-              <a:t>S1</a:t>
-            </a:r>
-            <a:endParaRPr lang="en-US" sz="1600" dirty="0" smtClean="0">
-              <a:solidFill>
-                <a:schemeClr val="tx2"/>
-              </a:solidFill>
-              <a:latin typeface="Courier New"/>
-              <a:cs typeface="Courier New"/>
-            </a:endParaRPr>
-          </a:p>
-          <a:p>
-            <a:r>
-              <a:rPr lang="en-US" sz="1600" dirty="0" smtClean="0">
-                <a:solidFill>
-                  <a:schemeClr val="tx2"/>
-                </a:solidFill>
-                <a:latin typeface="Courier New"/>
-                <a:cs typeface="Courier New"/>
-              </a:rPr>
-              <a:t>     [</a:t>
-            </a:r>
-            <a:r>
-              <a:rPr lang="en-US" sz="1600" dirty="0" smtClean="0">
-                <a:solidFill>
-                  <a:schemeClr val="tx2"/>
-                </a:solidFill>
-                <a:latin typeface="Courier New"/>
-                <a:cs typeface="Courier New"/>
-              </a:rPr>
-              <a:t>1]</a:t>
-            </a:r>
-            <a:r>
-              <a:rPr lang="en-US" sz="800" dirty="0" smtClean="0">
-                <a:solidFill>
-                  <a:schemeClr val="tx2"/>
-                </a:solidFill>
-                <a:latin typeface="Courier New"/>
-                <a:cs typeface="Courier New"/>
-              </a:rPr>
-              <a:t> </a:t>
-            </a:r>
-            <a:r>
-              <a:rPr lang="en-US" sz="800" dirty="0" smtClean="0">
-                <a:solidFill>
-                  <a:schemeClr val="tx2"/>
-                </a:solidFill>
-                <a:latin typeface="Courier New"/>
-                <a:cs typeface="Courier New"/>
-              </a:rPr>
-              <a:t> </a:t>
+              <a:t>  </a:t>
             </a:r>
             <a:r>
               <a:rPr lang="en-US" sz="1600" dirty="0" smtClean="0">
@@ -12158,13 +11989,6 @@
               </a:rPr>
               <a:t>1      1       1   </a:t>
             </a:r>
-            <a:endParaRPr lang="en-US" sz="1600" dirty="0" smtClean="0">
-              <a:solidFill>
-                <a:schemeClr val="tx2"/>
-              </a:solidFill>
-              <a:latin typeface="Courier New"/>
-              <a:cs typeface="Courier New"/>
-            </a:endParaRPr>
           </a:p>
           <a:p>
             <a:endParaRPr lang="en-US" sz="1600" dirty="0">
@@ -12284,8 +12108,10 @@
                 <a:latin typeface="Courier New"/>
                 <a:cs typeface="Courier New"/>
               </a:rPr>
-              <a:t>[1</a:t>
-            </a:r>
+              <a:t>[1]    5400</a:t>
+            </a:r>
+          </a:p>
+          <a:p>
             <a:r>
               <a:rPr lang="en-US" sz="1600" dirty="0" smtClean="0">
                 <a:solidFill>
@@ -12294,15 +12120,8 @@
                 <a:latin typeface="Courier New"/>
                 <a:cs typeface="Courier New"/>
               </a:rPr>
-              <a:t>]    5400</a:t>
-            </a:r>
-            <a:endParaRPr lang="en-US" sz="1600" dirty="0" smtClean="0">
-              <a:solidFill>
-                <a:schemeClr val="tx2"/>
-              </a:solidFill>
-              <a:latin typeface="Courier New"/>
-              <a:cs typeface="Courier New"/>
-            </a:endParaRPr>
+              <a:t>[2]    7600</a:t>
+            </a:r>
           </a:p>
           <a:p>
             <a:r>
@@ -12313,8 +12132,10 @@
                 <a:latin typeface="Courier New"/>
                 <a:cs typeface="Courier New"/>
               </a:rPr>
-              <a:t>[2]    </a:t>
-            </a:r>
+              <a:t>[3]    2650</a:t>
+            </a:r>
+          </a:p>
+          <a:p>
             <a:r>
               <a:rPr lang="en-US" sz="1600" dirty="0" smtClean="0">
                 <a:solidFill>
@@ -12323,73 +12144,8 @@
                 <a:latin typeface="Courier New"/>
                 <a:cs typeface="Courier New"/>
               </a:rPr>
-              <a:t>7600</a:t>
-            </a:r>
-            <a:endParaRPr lang="en-US" sz="1600" dirty="0" smtClean="0">
-              <a:solidFill>
-                <a:schemeClr val="tx2"/>
-              </a:solidFill>
-              <a:latin typeface="Courier New"/>
-              <a:cs typeface="Courier New"/>
-            </a:endParaRPr>
-          </a:p>
-          <a:p>
-            <a:r>
-              <a:rPr lang="en-US" sz="1600" dirty="0" smtClean="0">
-                <a:solidFill>
-                  <a:schemeClr val="tx2"/>
-                </a:solidFill>
-                <a:latin typeface="Courier New"/>
-                <a:cs typeface="Courier New"/>
-              </a:rPr>
-              <a:t>[3]    </a:t>
-            </a:r>
-            <a:r>
-              <a:rPr lang="en-US" sz="1600" dirty="0" smtClean="0">
-                <a:solidFill>
-                  <a:schemeClr val="tx2"/>
-                </a:solidFill>
-                <a:latin typeface="Courier New"/>
-                <a:cs typeface="Courier New"/>
-              </a:rPr>
-              <a:t>2650</a:t>
-            </a:r>
-            <a:endParaRPr lang="en-US" sz="1600" dirty="0" smtClean="0">
-              <a:solidFill>
-                <a:schemeClr val="tx2"/>
-              </a:solidFill>
-              <a:latin typeface="Courier New"/>
-              <a:cs typeface="Courier New"/>
-            </a:endParaRPr>
-          </a:p>
-          <a:p>
-            <a:r>
-              <a:rPr lang="en-US" sz="1600" dirty="0" smtClean="0">
-                <a:solidFill>
-                  <a:schemeClr val="tx2"/>
-                </a:solidFill>
-                <a:latin typeface="Courier New"/>
-                <a:cs typeface="Courier New"/>
-              </a:rPr>
-              <a:t>[4]    </a:t>
-            </a:r>
-            <a:r>
-              <a:rPr lang="en-US" sz="1600" dirty="0" smtClean="0">
-                <a:solidFill>
-                  <a:schemeClr val="tx2"/>
-                </a:solidFill>
-                <a:latin typeface="Courier New"/>
-                <a:cs typeface="Courier New"/>
-              </a:rPr>
-              <a:t>4800</a:t>
-            </a:r>
-            <a:endParaRPr lang="en-US" sz="1600" dirty="0" smtClean="0">
-              <a:solidFill>
-                <a:schemeClr val="tx2"/>
-              </a:solidFill>
-              <a:latin typeface="Courier New"/>
-              <a:cs typeface="Courier New"/>
-            </a:endParaRPr>
+              <a:t>[4]    4800</a:t>
+            </a:r>
           </a:p>
           <a:p>
             <a:pPr algn="ctr"/>
@@ -12449,10 +12205,10 @@
                 <a:latin typeface="Courier New"/>
                 <a:cs typeface="Courier New"/>
               </a:rPr>
-              <a:t>                        </a:t>
-            </a:r>
-            <a:r>
-              <a:rPr lang="en-US" sz="2400" dirty="0" smtClean="0">
+              <a:t>                         </a:t>
+            </a:r>
+            <a:r>
+              <a:rPr lang="en-US" sz="2400" b="1" dirty="0" smtClean="0">
                 <a:solidFill>
                   <a:schemeClr val="tx1">
                     <a:lumMod val="50000"/>
@@ -12462,40 +12218,17 @@
                 <a:latin typeface="Courier New"/>
                 <a:cs typeface="Courier New"/>
               </a:rPr>
-              <a:t> </a:t>
+              <a:t> Sample 2 </a:t>
             </a:r>
             <a:r>
               <a:rPr lang="en-US" sz="2400" b="1" dirty="0" smtClean="0">
                 <a:solidFill>
-                  <a:schemeClr val="tx1">
-                    <a:lumMod val="50000"/>
-                    <a:lumOff val="50000"/>
-                  </a:schemeClr>
-                </a:solidFill>
-                <a:latin typeface="Courier New"/>
-                <a:cs typeface="Courier New"/>
-              </a:rPr>
-              <a:t> Sample 2 </a:t>
-            </a:r>
-            <a:r>
-              <a:rPr lang="en-US" sz="2400" b="1" dirty="0" smtClean="0">
-                <a:solidFill>
                   <a:srgbClr val="000000"/>
                 </a:solidFill>
                 <a:latin typeface="Courier New"/>
                 <a:cs typeface="Courier New"/>
               </a:rPr>
-              <a:t>loops </a:t>
-            </a:r>
-            <a:r>
-              <a:rPr lang="en-US" sz="2400" b="1" dirty="0" smtClean="0">
-                <a:solidFill>
-                  <a:srgbClr val="000000"/>
-                </a:solidFill>
-                <a:latin typeface="Courier New"/>
-                <a:cs typeface="Courier New"/>
-              </a:rPr>
-              <a:t>Object</a:t>
+              <a:t>loops Object</a:t>
             </a:r>
             <a:endParaRPr lang="en-US" sz="2400" dirty="0" smtClean="0">
               <a:solidFill>
@@ -12650,8 +12383,10 @@
                 <a:latin typeface="Courier New"/>
                 <a:cs typeface="Courier New"/>
               </a:rPr>
-              <a:t>[1] </a:t>
-            </a:r>
+              <a:t>[1] Z  1200  2300</a:t>
+            </a:r>
+          </a:p>
+          <a:p>
             <a:r>
               <a:rPr lang="en-US" sz="1600" dirty="0" smtClean="0">
                 <a:solidFill>
@@ -12663,18 +12398,8 @@
                 <a:latin typeface="Courier New"/>
                 <a:cs typeface="Courier New"/>
               </a:rPr>
-              <a:t>Z  1200  2300</a:t>
-            </a:r>
-            <a:endParaRPr lang="en-US" sz="1600" dirty="0" smtClean="0">
-              <a:solidFill>
-                <a:schemeClr val="tx1">
-                  <a:lumMod val="50000"/>
-                  <a:lumOff val="50000"/>
-                </a:schemeClr>
-              </a:solidFill>
-              <a:latin typeface="Courier New"/>
-              <a:cs typeface="Courier New"/>
-            </a:endParaRPr>
+              <a:t>[2] Z  4000  5200</a:t>
+            </a:r>
           </a:p>
           <a:p>
             <a:r>
@@ -12688,8 +12413,10 @@
                 <a:latin typeface="Courier New"/>
                 <a:cs typeface="Courier New"/>
               </a:rPr>
-              <a:t>[2] </a:t>
-            </a:r>
+              <a:t>[3] Z  6500  7800</a:t>
+            </a:r>
+          </a:p>
+          <a:p>
             <a:r>
               <a:rPr lang="en-US" sz="1600" dirty="0" smtClean="0">
                 <a:solidFill>
@@ -12701,94 +12428,8 @@
                 <a:latin typeface="Courier New"/>
                 <a:cs typeface="Courier New"/>
               </a:rPr>
-              <a:t>Z  4000  5200</a:t>
-            </a:r>
-            <a:endParaRPr lang="en-US" sz="1600" dirty="0" smtClean="0">
-              <a:solidFill>
-                <a:schemeClr val="tx1">
-                  <a:lumMod val="50000"/>
-                  <a:lumOff val="50000"/>
-                </a:schemeClr>
-              </a:solidFill>
-              <a:latin typeface="Courier New"/>
-              <a:cs typeface="Courier New"/>
-            </a:endParaRPr>
-          </a:p>
-          <a:p>
-            <a:r>
-              <a:rPr lang="en-US" sz="1600" dirty="0" smtClean="0">
-                <a:solidFill>
-                  <a:schemeClr val="tx1">
-                    <a:lumMod val="50000"/>
-                    <a:lumOff val="50000"/>
-                  </a:schemeClr>
-                </a:solidFill>
-                <a:latin typeface="Courier New"/>
-                <a:cs typeface="Courier New"/>
-              </a:rPr>
-              <a:t>[3] </a:t>
-            </a:r>
-            <a:r>
-              <a:rPr lang="en-US" sz="1600" dirty="0" smtClean="0">
-                <a:solidFill>
-                  <a:schemeClr val="tx1">
-                    <a:lumMod val="50000"/>
-                    <a:lumOff val="50000"/>
-                  </a:schemeClr>
-                </a:solidFill>
-                <a:latin typeface="Courier New"/>
-                <a:cs typeface="Courier New"/>
-              </a:rPr>
-              <a:t>Z  6500  7800</a:t>
-            </a:r>
-            <a:endParaRPr lang="en-US" sz="1600" dirty="0" smtClean="0">
-              <a:solidFill>
-                <a:schemeClr val="tx1">
-                  <a:lumMod val="50000"/>
-                  <a:lumOff val="50000"/>
-                </a:schemeClr>
-              </a:solidFill>
-              <a:latin typeface="Courier New"/>
-              <a:cs typeface="Courier New"/>
-            </a:endParaRPr>
-          </a:p>
-          <a:p>
-            <a:r>
-              <a:rPr lang="en-US" sz="1600" dirty="0" smtClean="0">
-                <a:solidFill>
-                  <a:schemeClr val="tx1">
-                    <a:lumMod val="50000"/>
-                    <a:lumOff val="50000"/>
-                  </a:schemeClr>
-                </a:solidFill>
-                <a:latin typeface="Courier New"/>
-                <a:cs typeface="Courier New"/>
-              </a:rPr>
-              <a:t>[4] </a:t>
-            </a:r>
-            <a:r>
-              <a:rPr lang="en-US" sz="1600" dirty="0" smtClean="0">
-                <a:solidFill>
-                  <a:schemeClr val="tx1">
-                    <a:lumMod val="50000"/>
-                    <a:lumOff val="50000"/>
-                  </a:schemeClr>
-                </a:solidFill>
-                <a:latin typeface="Courier New"/>
-                <a:cs typeface="Courier New"/>
-              </a:rPr>
-              <a:t>Z  8900  9900</a:t>
-            </a:r>
-            <a:endParaRPr lang="en-US" sz="1600" dirty="0" smtClean="0">
-              <a:solidFill>
-                <a:schemeClr val="tx1">
-                  <a:lumMod val="50000"/>
-                  <a:lumOff val="50000"/>
-                </a:schemeClr>
-              </a:solidFill>
-              <a:latin typeface="Courier New"/>
-              <a:cs typeface="Courier New"/>
-            </a:endParaRPr>
+              <a:t>[4] Z  8900  9900</a:t>
+            </a:r>
           </a:p>
           <a:p>
             <a:pPr algn="ctr"/>
@@ -12959,7 +12600,7 @@
                 <a:latin typeface="Courier New"/>
                 <a:cs typeface="Courier New"/>
               </a:rPr>
-              <a:t>3</a:t>
+              <a:t>2</a:t>
             </a:r>
             <a:endParaRPr lang="en-US" sz="1600" dirty="0" smtClean="0">
               <a:solidFill>
@@ -13013,7 +12654,7 @@
               <a:t>]    1     </a:t>
             </a:r>
             <a:r>
-              <a:rPr lang="en-US" sz="1600" dirty="0" smtClean="0">
+              <a:rPr lang="en-US" sz="1600" dirty="0">
                 <a:solidFill>
                   <a:schemeClr val="tx1">
                     <a:lumMod val="50000"/>
@@ -13023,7 +12664,7 @@
                 <a:latin typeface="Courier New"/>
                 <a:cs typeface="Courier New"/>
               </a:rPr>
-              <a:t>4</a:t>
+              <a:t>3</a:t>
             </a:r>
             <a:endParaRPr lang="en-US" sz="1600" dirty="0">
               <a:solidFill>
@@ -13061,7 +12702,20 @@
                 <a:latin typeface="Courier New"/>
                 <a:cs typeface="Courier New"/>
               </a:rPr>
-              <a:t>]    2     3</a:t>
+              <a:t>]    1</a:t>
+            </a:r>
+            <a:r>
+              <a:rPr lang="en-US" sz="1600" dirty="0" smtClean="0">
+                <a:solidFill>
+                  <a:schemeClr val="tx1">
+                    <a:lumMod val="50000"/>
+                    <a:lumOff val="50000"/>
+                  </a:schemeClr>
+                </a:solidFill>
+                <a:latin typeface="Courier New"/>
+                <a:cs typeface="Courier New"/>
+              </a:rPr>
+              <a:t>     4</a:t>
             </a:r>
             <a:endParaRPr lang="en-US" sz="1600" dirty="0">
               <a:solidFill>
@@ -13197,7 +12851,7 @@
                 <a:latin typeface="Courier New"/>
                 <a:cs typeface="Courier New"/>
               </a:rPr>
-              <a:t>    </a:t>
+              <a:t>          </a:t>
             </a:r>
             <a:r>
               <a:rPr lang="en-US" sz="1600" dirty="0" smtClean="0">
@@ -13210,20 +12864,7 @@
                 <a:latin typeface="Courier New"/>
                 <a:cs typeface="Courier New"/>
               </a:rPr>
-              <a:t>      </a:t>
-            </a:r>
-            <a:r>
-              <a:rPr lang="en-US" sz="1600" dirty="0" smtClean="0">
-                <a:solidFill>
-                  <a:schemeClr val="tx1">
-                    <a:lumMod val="50000"/>
-                    <a:lumOff val="50000"/>
-                  </a:schemeClr>
-                </a:solidFill>
-                <a:latin typeface="Courier New"/>
-                <a:cs typeface="Courier New"/>
-              </a:rPr>
-              <a:t>S1</a:t>
+              <a:t>S2</a:t>
             </a:r>
             <a:endParaRPr lang="en-US" sz="1600" dirty="0" smtClean="0">
               <a:solidFill>
@@ -13248,10 +12889,10 @@
                 <a:latin typeface="Courier New"/>
                 <a:cs typeface="Courier New"/>
               </a:rPr>
-              <a:t>     [</a:t>
-            </a:r>
-            <a:r>
-              <a:rPr lang="en-US" sz="1600" dirty="0" smtClean="0">
+              <a:t>     [1]</a:t>
+            </a:r>
+            <a:r>
+              <a:rPr lang="en-US" sz="800" dirty="0" smtClean="0">
                 <a:solidFill>
                   <a:schemeClr val="tx1">
                     <a:lumMod val="50000"/>
@@ -13261,10 +12902,10 @@
                 <a:latin typeface="Courier New"/>
                 <a:cs typeface="Courier New"/>
               </a:rPr>
-              <a:t>1]</a:t>
-            </a:r>
-            <a:r>
-              <a:rPr lang="en-US" sz="800" dirty="0" smtClean="0">
+              <a:t>  </a:t>
+            </a:r>
+            <a:r>
+              <a:rPr lang="en-US" sz="1600" dirty="0" smtClean="0">
                 <a:solidFill>
                   <a:schemeClr val="tx1">
                     <a:lumMod val="50000"/>
@@ -13274,10 +12915,12 @@
                 <a:latin typeface="Courier New"/>
                 <a:cs typeface="Courier New"/>
               </a:rPr>
-              <a:t> </a:t>
-            </a:r>
-            <a:r>
-              <a:rPr lang="en-US" sz="800" dirty="0" smtClean="0">
+              <a:t> 2  </a:t>
+            </a:r>
+          </a:p>
+          <a:p>
+            <a:r>
+              <a:rPr lang="en-US" sz="1600" dirty="0">
                 <a:solidFill>
                   <a:schemeClr val="tx1">
                     <a:lumMod val="50000"/>
@@ -13300,12 +12943,10 @@
                 <a:latin typeface="Courier New"/>
                 <a:cs typeface="Courier New"/>
               </a:rPr>
-              <a:t> 2  </a:t>
-            </a:r>
-          </a:p>
-          <a:p>
-            <a:r>
-              <a:rPr lang="en-US" sz="1600" dirty="0">
+              <a:t>    [2]  </a:t>
+            </a:r>
+            <a:r>
+              <a:rPr lang="en-US" sz="1600" dirty="0" smtClean="0">
                 <a:solidFill>
                   <a:schemeClr val="tx1">
                     <a:lumMod val="50000"/>
@@ -13315,10 +12956,22 @@
                 <a:latin typeface="Courier New"/>
                 <a:cs typeface="Courier New"/>
               </a:rPr>
-              <a:t> </a:t>
-            </a:r>
-            <a:r>
-              <a:rPr lang="en-US" sz="1600" dirty="0" smtClean="0">
+              <a:t>1</a:t>
+            </a:r>
+            <a:endParaRPr lang="en-US" sz="1600" dirty="0" smtClean="0">
+              <a:solidFill>
+                <a:schemeClr val="tx1">
+                  <a:lumMod val="50000"/>
+                  <a:lumOff val="50000"/>
+                </a:schemeClr>
+              </a:solidFill>
+              <a:latin typeface="Courier New"/>
+              <a:cs typeface="Courier New"/>
+            </a:endParaRPr>
+          </a:p>
+          <a:p>
+            <a:r>
+              <a:rPr lang="en-US" sz="1600" dirty="0">
                 <a:solidFill>
                   <a:schemeClr val="tx1">
                     <a:lumMod val="50000"/>
@@ -13328,12 +12981,10 @@
                 <a:latin typeface="Courier New"/>
                 <a:cs typeface="Courier New"/>
               </a:rPr>
-              <a:t>    [2]  6</a:t>
-            </a:r>
-          </a:p>
-          <a:p>
-            <a:r>
-              <a:rPr lang="en-US" sz="1600" dirty="0">
+              <a:t> </a:t>
+            </a:r>
+            <a:r>
+              <a:rPr lang="en-US" sz="1600" dirty="0" smtClean="0">
                 <a:solidFill>
                   <a:schemeClr val="tx1">
                     <a:lumMod val="50000"/>
@@ -13343,7 +12994,7 @@
                 <a:latin typeface="Courier New"/>
                 <a:cs typeface="Courier New"/>
               </a:rPr>
-              <a:t> </a:t>
+              <a:t>    [3]  </a:t>
             </a:r>
             <a:r>
               <a:rPr lang="en-US" sz="1600" dirty="0" smtClean="0">
@@ -13356,8 +13007,18 @@
                 <a:latin typeface="Courier New"/>
                 <a:cs typeface="Courier New"/>
               </a:rPr>
-              <a:t>    [3]  3</a:t>
-            </a:r>
+              <a:t>8</a:t>
+            </a:r>
+            <a:endParaRPr lang="en-US" sz="1600" dirty="0" smtClean="0">
+              <a:solidFill>
+                <a:schemeClr val="tx1">
+                  <a:lumMod val="50000"/>
+                  <a:lumOff val="50000"/>
+                </a:schemeClr>
+              </a:solidFill>
+              <a:latin typeface="Courier New"/>
+              <a:cs typeface="Courier New"/>
+            </a:endParaRPr>
           </a:p>
           <a:p>
             <a:r>
@@ -13384,7 +13045,33 @@
                 <a:latin typeface="Courier New"/>
                 <a:cs typeface="Courier New"/>
               </a:rPr>
-              <a:t>    [4]  7</a:t>
+              <a:t>    [4</a:t>
+            </a:r>
+            <a:r>
+              <a:rPr lang="en-US" sz="1600" smtClean="0">
+                <a:solidFill>
+                  <a:schemeClr val="tx1">
+                    <a:lumMod val="50000"/>
+                    <a:lumOff val="50000"/>
+                  </a:schemeClr>
+                </a:solidFill>
+                <a:latin typeface="Courier New"/>
+                <a:cs typeface="Courier New"/>
+              </a:rPr>
+              <a:t>]  </a:t>
+            </a:r>
+            <a:r>
+              <a:rPr lang="en-US" sz="1600" smtClean="0">
+                <a:solidFill>
+                  <a:schemeClr val="tx1">
+                    <a:lumMod val="50000"/>
+                    <a:lumOff val="50000"/>
+                  </a:schemeClr>
+                </a:solidFill>
+                <a:latin typeface="Courier New"/>
+                <a:cs typeface="Courier New"/>
+              </a:rPr>
+              <a:t>2</a:t>
             </a:r>
             <a:endParaRPr lang="en-US" sz="1600" dirty="0">
               <a:solidFill>
@@ -13531,16 +13218,6 @@
               </a:rPr>
               <a:t>1      1       1   </a:t>
             </a:r>
-            <a:endParaRPr lang="en-US" sz="1600" dirty="0" smtClean="0">
-              <a:solidFill>
-                <a:schemeClr val="tx1">
-                  <a:lumMod val="50000"/>
-                  <a:lumOff val="50000"/>
-                </a:schemeClr>
-              </a:solidFill>
-              <a:latin typeface="Courier New"/>
-              <a:cs typeface="Courier New"/>
-            </a:endParaRPr>
           </a:p>
           <a:p>
             <a:endParaRPr lang="en-US" sz="1600" dirty="0">
@@ -13687,7 +13364,7 @@
                 <a:latin typeface="Courier New"/>
                 <a:cs typeface="Courier New"/>
               </a:rPr>
-              <a:t>[1</a:t>
+              <a:t>[1]    </a:t>
             </a:r>
             <a:r>
               <a:rPr lang="en-US" sz="1600" dirty="0" smtClean="0">
@@ -13700,7 +13377,7 @@
                 <a:latin typeface="Courier New"/>
                 <a:cs typeface="Courier New"/>
               </a:rPr>
-              <a:t>]    5400</a:t>
+              <a:t>2850</a:t>
             </a:r>
             <a:endParaRPr lang="en-US" sz="1600" dirty="0" smtClean="0">
               <a:solidFill>
@@ -13738,7 +13415,7 @@
                 <a:latin typeface="Courier New"/>
                 <a:cs typeface="Courier New"/>
               </a:rPr>
-              <a:t>7600</a:t>
+              <a:t>5400</a:t>
             </a:r>
             <a:endParaRPr lang="en-US" sz="1600" dirty="0" smtClean="0">
               <a:solidFill>
@@ -13776,7 +13453,7 @@
                 <a:latin typeface="Courier New"/>
                 <a:cs typeface="Courier New"/>
               </a:rPr>
-              <a:t>2650</a:t>
+              <a:t>7650</a:t>
             </a:r>
             <a:endParaRPr lang="en-US" sz="1600" dirty="0" smtClean="0">
               <a:solidFill>
@@ -13801,31 +13478,8 @@
                 <a:latin typeface="Courier New"/>
                 <a:cs typeface="Courier New"/>
               </a:rPr>
-              <a:t>[4]    </a:t>
-            </a:r>
-            <a:r>
-              <a:rPr lang="en-US" sz="1600" dirty="0" smtClean="0">
-                <a:solidFill>
-                  <a:schemeClr val="tx1">
-                    <a:lumMod val="50000"/>
-                    <a:lumOff val="50000"/>
-                  </a:schemeClr>
-                </a:solidFill>
-                <a:latin typeface="Courier New"/>
-                <a:cs typeface="Courier New"/>
-              </a:rPr>
-              <a:t>4800</a:t>
-            </a:r>
-            <a:endParaRPr lang="en-US" sz="1600" dirty="0" smtClean="0">
-              <a:solidFill>
-                <a:schemeClr val="tx1">
-                  <a:lumMod val="50000"/>
-                  <a:lumOff val="50000"/>
-                </a:schemeClr>
-              </a:solidFill>
-              <a:latin typeface="Courier New"/>
-              <a:cs typeface="Courier New"/>
-            </a:endParaRPr>
+              <a:t>[4]    4800</a:t>
+            </a:r>
           </a:p>
           <a:p>
             <a:pPr algn="ctr"/>

</xml_diff>

<commit_message>
html QC report rendering; update README
</commit_message>
<xml_diff>
--- a/media/Big.pptx
+++ b/media/Big.pptx
@@ -288,7 +288,7 @@
           <a:p>
             <a:fld id="{FB66550A-E8B4-9C43-82D6-18329C2422C3}" type="datetimeFigureOut">
               <a:rPr lang="en-US" smtClean="0"/>
-              <a:t>10/21/16</a:t>
+              <a:t>11/6/16</a:t>
             </a:fld>
             <a:endParaRPr lang="en-US"/>
           </a:p>
@@ -458,7 +458,7 @@
           <a:p>
             <a:fld id="{FB66550A-E8B4-9C43-82D6-18329C2422C3}" type="datetimeFigureOut">
               <a:rPr lang="en-US" smtClean="0"/>
-              <a:t>10/21/16</a:t>
+              <a:t>11/6/16</a:t>
             </a:fld>
             <a:endParaRPr lang="en-US"/>
           </a:p>
@@ -638,7 +638,7 @@
           <a:p>
             <a:fld id="{FB66550A-E8B4-9C43-82D6-18329C2422C3}" type="datetimeFigureOut">
               <a:rPr lang="en-US" smtClean="0"/>
-              <a:t>10/21/16</a:t>
+              <a:t>11/6/16</a:t>
             </a:fld>
             <a:endParaRPr lang="en-US"/>
           </a:p>
@@ -808,7 +808,7 @@
           <a:p>
             <a:fld id="{FB66550A-E8B4-9C43-82D6-18329C2422C3}" type="datetimeFigureOut">
               <a:rPr lang="en-US" smtClean="0"/>
-              <a:t>10/21/16</a:t>
+              <a:t>11/6/16</a:t>
             </a:fld>
             <a:endParaRPr lang="en-US"/>
           </a:p>
@@ -1054,7 +1054,7 @@
           <a:p>
             <a:fld id="{FB66550A-E8B4-9C43-82D6-18329C2422C3}" type="datetimeFigureOut">
               <a:rPr lang="en-US" smtClean="0"/>
-              <a:t>10/21/16</a:t>
+              <a:t>11/6/16</a:t>
             </a:fld>
             <a:endParaRPr lang="en-US"/>
           </a:p>
@@ -1342,7 +1342,7 @@
           <a:p>
             <a:fld id="{FB66550A-E8B4-9C43-82D6-18329C2422C3}" type="datetimeFigureOut">
               <a:rPr lang="en-US" smtClean="0"/>
-              <a:t>10/21/16</a:t>
+              <a:t>11/6/16</a:t>
             </a:fld>
             <a:endParaRPr lang="en-US"/>
           </a:p>
@@ -1769,7 +1769,7 @@
           <a:p>
             <a:fld id="{FB66550A-E8B4-9C43-82D6-18329C2422C3}" type="datetimeFigureOut">
               <a:rPr lang="en-US" smtClean="0"/>
-              <a:t>10/21/16</a:t>
+              <a:t>11/6/16</a:t>
             </a:fld>
             <a:endParaRPr lang="en-US"/>
           </a:p>
@@ -1887,7 +1887,7 @@
           <a:p>
             <a:fld id="{FB66550A-E8B4-9C43-82D6-18329C2422C3}" type="datetimeFigureOut">
               <a:rPr lang="en-US" smtClean="0"/>
-              <a:t>10/21/16</a:t>
+              <a:t>11/6/16</a:t>
             </a:fld>
             <a:endParaRPr lang="en-US"/>
           </a:p>
@@ -1982,7 +1982,7 @@
           <a:p>
             <a:fld id="{FB66550A-E8B4-9C43-82D6-18329C2422C3}" type="datetimeFigureOut">
               <a:rPr lang="en-US" smtClean="0"/>
-              <a:t>10/21/16</a:t>
+              <a:t>11/6/16</a:t>
             </a:fld>
             <a:endParaRPr lang="en-US"/>
           </a:p>
@@ -2259,7 +2259,7 @@
           <a:p>
             <a:fld id="{FB66550A-E8B4-9C43-82D6-18329C2422C3}" type="datetimeFigureOut">
               <a:rPr lang="en-US" smtClean="0"/>
-              <a:t>10/21/16</a:t>
+              <a:t>11/6/16</a:t>
             </a:fld>
             <a:endParaRPr lang="en-US"/>
           </a:p>
@@ -2512,7 +2512,7 @@
           <a:p>
             <a:fld id="{FB66550A-E8B4-9C43-82D6-18329C2422C3}" type="datetimeFigureOut">
               <a:rPr lang="en-US" smtClean="0"/>
-              <a:t>10/21/16</a:t>
+              <a:t>11/6/16</a:t>
             </a:fld>
             <a:endParaRPr lang="en-US"/>
           </a:p>
@@ -2725,7 +2725,7 @@
           <a:p>
             <a:fld id="{FB66550A-E8B4-9C43-82D6-18329C2422C3}" type="datetimeFigureOut">
               <a:rPr lang="en-US" smtClean="0"/>
-              <a:t>10/21/16</a:t>
+              <a:t>11/6/16</a:t>
             </a:fld>
             <a:endParaRPr lang="en-US"/>
           </a:p>
@@ -13615,7 +13615,7 @@
                 <a:latin typeface="Courier New"/>
                 <a:cs typeface="Courier New"/>
               </a:rPr>
-              <a:t>.pdf</a:t>
+              <a:t>.html</a:t>
             </a:r>
             <a:endParaRPr lang="en-US" sz="8000" b="1" dirty="0">
               <a:latin typeface="Courier New"/>

</xml_diff>

<commit_message>
QC report tweaks; uploaded initial ones
</commit_message>
<xml_diff>
--- a/media/Big.pptx
+++ b/media/Big.pptx
@@ -288,7 +288,7 @@
           <a:p>
             <a:fld id="{FB66550A-E8B4-9C43-82D6-18329C2422C3}" type="datetimeFigureOut">
               <a:rPr lang="en-US" smtClean="0"/>
-              <a:t>11/6/16</a:t>
+              <a:t>11/7/16</a:t>
             </a:fld>
             <a:endParaRPr lang="en-US"/>
           </a:p>
@@ -458,7 +458,7 @@
           <a:p>
             <a:fld id="{FB66550A-E8B4-9C43-82D6-18329C2422C3}" type="datetimeFigureOut">
               <a:rPr lang="en-US" smtClean="0"/>
-              <a:t>11/6/16</a:t>
+              <a:t>11/7/16</a:t>
             </a:fld>
             <a:endParaRPr lang="en-US"/>
           </a:p>
@@ -638,7 +638,7 @@
           <a:p>
             <a:fld id="{FB66550A-E8B4-9C43-82D6-18329C2422C3}" type="datetimeFigureOut">
               <a:rPr lang="en-US" smtClean="0"/>
-              <a:t>11/6/16</a:t>
+              <a:t>11/7/16</a:t>
             </a:fld>
             <a:endParaRPr lang="en-US"/>
           </a:p>
@@ -808,7 +808,7 @@
           <a:p>
             <a:fld id="{FB66550A-E8B4-9C43-82D6-18329C2422C3}" type="datetimeFigureOut">
               <a:rPr lang="en-US" smtClean="0"/>
-              <a:t>11/6/16</a:t>
+              <a:t>11/7/16</a:t>
             </a:fld>
             <a:endParaRPr lang="en-US"/>
           </a:p>
@@ -1054,7 +1054,7 @@
           <a:p>
             <a:fld id="{FB66550A-E8B4-9C43-82D6-18329C2422C3}" type="datetimeFigureOut">
               <a:rPr lang="en-US" smtClean="0"/>
-              <a:t>11/6/16</a:t>
+              <a:t>11/7/16</a:t>
             </a:fld>
             <a:endParaRPr lang="en-US"/>
           </a:p>
@@ -1342,7 +1342,7 @@
           <a:p>
             <a:fld id="{FB66550A-E8B4-9C43-82D6-18329C2422C3}" type="datetimeFigureOut">
               <a:rPr lang="en-US" smtClean="0"/>
-              <a:t>11/6/16</a:t>
+              <a:t>11/7/16</a:t>
             </a:fld>
             <a:endParaRPr lang="en-US"/>
           </a:p>
@@ -1769,7 +1769,7 @@
           <a:p>
             <a:fld id="{FB66550A-E8B4-9C43-82D6-18329C2422C3}" type="datetimeFigureOut">
               <a:rPr lang="en-US" smtClean="0"/>
-              <a:t>11/6/16</a:t>
+              <a:t>11/7/16</a:t>
             </a:fld>
             <a:endParaRPr lang="en-US"/>
           </a:p>
@@ -1887,7 +1887,7 @@
           <a:p>
             <a:fld id="{FB66550A-E8B4-9C43-82D6-18329C2422C3}" type="datetimeFigureOut">
               <a:rPr lang="en-US" smtClean="0"/>
-              <a:t>11/6/16</a:t>
+              <a:t>11/7/16</a:t>
             </a:fld>
             <a:endParaRPr lang="en-US"/>
           </a:p>
@@ -1982,7 +1982,7 @@
           <a:p>
             <a:fld id="{FB66550A-E8B4-9C43-82D6-18329C2422C3}" type="datetimeFigureOut">
               <a:rPr lang="en-US" smtClean="0"/>
-              <a:t>11/6/16</a:t>
+              <a:t>11/7/16</a:t>
             </a:fld>
             <a:endParaRPr lang="en-US"/>
           </a:p>
@@ -2259,7 +2259,7 @@
           <a:p>
             <a:fld id="{FB66550A-E8B4-9C43-82D6-18329C2422C3}" type="datetimeFigureOut">
               <a:rPr lang="en-US" smtClean="0"/>
-              <a:t>11/6/16</a:t>
+              <a:t>11/7/16</a:t>
             </a:fld>
             <a:endParaRPr lang="en-US"/>
           </a:p>
@@ -2512,7 +2512,7 @@
           <a:p>
             <a:fld id="{FB66550A-E8B4-9C43-82D6-18329C2422C3}" type="datetimeFigureOut">
               <a:rPr lang="en-US" smtClean="0"/>
-              <a:t>11/6/16</a:t>
+              <a:t>11/7/16</a:t>
             </a:fld>
             <a:endParaRPr lang="en-US"/>
           </a:p>
@@ -2725,7 +2725,7 @@
           <a:p>
             <a:fld id="{FB66550A-E8B4-9C43-82D6-18329C2422C3}" type="datetimeFigureOut">
               <a:rPr lang="en-US" smtClean="0"/>
-              <a:t>11/6/16</a:t>
+              <a:t>11/7/16</a:t>
             </a:fld>
             <a:endParaRPr lang="en-US"/>
           </a:p>
@@ -13624,36 +13624,6 @@
           </a:p>
         </p:txBody>
       </p:sp>
-      <p:pic>
-        <p:nvPicPr>
-          <p:cNvPr id="215" name="Picture 214" descr="Screen Shot 2016-10-16 at 11.10.23 AM.png"/>
-          <p:cNvPicPr>
-            <a:picLocks noChangeAspect="1"/>
-          </p:cNvPicPr>
-          <p:nvPr/>
-        </p:nvPicPr>
-        <p:blipFill>
-          <a:blip r:embed="rId2">
-            <a:extLst>
-              <a:ext uri="{28A0092B-C50C-407E-A947-70E740481C1C}">
-                <a14:useLocalDpi xmlns:a14="http://schemas.microsoft.com/office/drawing/2010/main" val="0"/>
-              </a:ext>
-            </a:extLst>
-          </a:blip>
-          <a:stretch>
-            <a:fillRect/>
-          </a:stretch>
-        </p:blipFill>
-        <p:spPr>
-          <a:xfrm>
-            <a:off x="2424046" y="24787037"/>
-            <a:ext cx="10126261" cy="7780198"/>
-          </a:xfrm>
-          <a:prstGeom prst="rect">
-            <a:avLst/>
-          </a:prstGeom>
-        </p:spPr>
-      </p:pic>
       <p:cxnSp>
         <p:nvCxnSpPr>
           <p:cNvPr id="216" name="Straight Arrow Connector 215"/>
@@ -13772,6 +13742,41 @@
           </a:p>
         </p:txBody>
       </p:sp>
+      <p:pic>
+        <p:nvPicPr>
+          <p:cNvPr id="3" name="Picture 2" descr="Screen Shot 2016-11-07 at 11.50.14 PM.png"/>
+          <p:cNvPicPr>
+            <a:picLocks noChangeAspect="1"/>
+          </p:cNvPicPr>
+          <p:nvPr/>
+        </p:nvPicPr>
+        <p:blipFill>
+          <a:blip r:embed="rId2">
+            <a:extLst>
+              <a:ext uri="{28A0092B-C50C-407E-A947-70E740481C1C}">
+                <a14:useLocalDpi xmlns:a14="http://schemas.microsoft.com/office/drawing/2010/main" val="0"/>
+              </a:ext>
+            </a:extLst>
+          </a:blip>
+          <a:stretch>
+            <a:fillRect/>
+          </a:stretch>
+        </p:blipFill>
+        <p:spPr>
+          <a:xfrm>
+            <a:off x="1781038" y="24886766"/>
+            <a:ext cx="11613777" cy="7723162"/>
+          </a:xfrm>
+          <a:prstGeom prst="rect">
+            <a:avLst/>
+          </a:prstGeom>
+          <a:ln>
+            <a:solidFill>
+              <a:schemeClr val="tx1"/>
+            </a:solidFill>
+          </a:ln>
+        </p:spPr>
+      </p:pic>
     </p:spTree>
     <p:extLst>
       <p:ext uri="{BB962C8B-B14F-4D97-AF65-F5344CB8AC3E}">

</xml_diff>